<commit_message>
Removed Blockchain Reference in Chain.
</commit_message>
<xml_diff>
--- a/Doc/BitcoinNode.pptx
+++ b/Doc/BitcoinNode.pptx
@@ -4450,9 +4450,6 @@
               </a:rPr>
               <a:t>List&lt;BlockLocation&gt;</a:t>
             </a:r>
-            <a:endParaRPr lang="de-CH" sz="800" b="1" dirty="0">
-              <a:latin typeface="Arial Narrow" panose="020B0606020202030204" pitchFamily="34" charset="0"/>
-            </a:endParaRPr>
           </a:p>
         </p:txBody>
       </p:sp>
@@ -5136,9 +5133,6 @@
               </a:rPr>
               <a:t>List&lt;BlockLocation&gt;</a:t>
             </a:r>
-            <a:endParaRPr lang="de-CH" sz="800" b="1" dirty="0">
-              <a:latin typeface="Arial Narrow" panose="020B0606020202030204" pitchFamily="34" charset="0"/>
-            </a:endParaRPr>
           </a:p>
         </p:txBody>
       </p:sp>
@@ -5481,8 +5475,8 @@
               <a:p>
                 <a:pPr algn="ctr"/>
                 <a:r>
-                  <a:rPr lang="de-CH" sz="1200" b="1" dirty="0" smtClean="0"/>
-                  <a:t>Chain</a:t>
+                  <a:rPr lang="de-CH" sz="1200" b="1" smtClean="0"/>
+                  <a:t>MainChain</a:t>
                 </a:r>
                 <a:endParaRPr lang="de-CH" sz="1200" b="1" dirty="0"/>
               </a:p>

</xml_diff>

<commit_message>
Migrated block insertion into blockchain object
</commit_message>
<xml_diff>
--- a/Doc/BitcoinNode.pptx
+++ b/Doc/BitcoinNode.pptx
@@ -3647,8 +3647,8 @@
           </p:nvSpPr>
           <p:spPr>
             <a:xfrm>
-              <a:off x="3239815" y="1386876"/>
-              <a:ext cx="1224170" cy="276999"/>
+              <a:off x="3239815" y="1294543"/>
+              <a:ext cx="1224170" cy="461665"/>
             </a:xfrm>
             <a:prstGeom prst="rect">
               <a:avLst/>
@@ -3667,6 +3667,14 @@
                 <a:t>Blockchain</a:t>
               </a:r>
               <a:endParaRPr lang="de-CH" sz="1200" b="1" dirty="0"/>
+            </a:p>
+            <a:p>
+              <a:pPr algn="ctr"/>
+              <a:r>
+                <a:rPr lang="de-CH" sz="1200" dirty="0" smtClean="0"/>
+                <a:t>Blockchain</a:t>
+              </a:r>
+              <a:endParaRPr lang="de-CH" sz="1200" i="1" dirty="0"/>
             </a:p>
           </p:txBody>
         </p:sp>
@@ -3739,8 +3747,8 @@
           </p:nvSpPr>
           <p:spPr>
             <a:xfrm>
-              <a:off x="6120215" y="1384578"/>
-              <a:ext cx="1224170" cy="276999"/>
+              <a:off x="6012200" y="1292245"/>
+              <a:ext cx="1440200" cy="461665"/>
             </a:xfrm>
             <a:prstGeom prst="rect">
               <a:avLst/>
@@ -3755,10 +3763,17 @@
             <a:p>
               <a:pPr algn="ctr"/>
               <a:r>
-                <a:rPr lang="de-CH" sz="1200" b="1" dirty="0" smtClean="0"/>
+                <a:rPr lang="de-CH" sz="1200" b="1" dirty="0"/>
                 <a:t>UTXO</a:t>
               </a:r>
-              <a:endParaRPr lang="de-CH" sz="1200" b="1" dirty="0"/>
+            </a:p>
+            <a:p>
+              <a:pPr algn="ctr"/>
+              <a:r>
+                <a:rPr lang="de-CH" sz="1200" dirty="0" smtClean="0"/>
+                <a:t>UnspentTXOutputs</a:t>
+              </a:r>
+              <a:endParaRPr lang="de-CH" sz="1200" dirty="0" smtClean="0"/>
             </a:p>
           </p:txBody>
         </p:sp>
@@ -3831,8 +3846,8 @@
           </p:nvSpPr>
           <p:spPr>
             <a:xfrm>
-              <a:off x="4680015" y="4827968"/>
-              <a:ext cx="1224170" cy="307777"/>
+              <a:off x="4680015" y="4725180"/>
+              <a:ext cx="1224170" cy="923330"/>
             </a:xfrm>
             <a:prstGeom prst="rect">
               <a:avLst/>
@@ -3847,10 +3862,16 @@
             <a:p>
               <a:pPr algn="ctr"/>
               <a:r>
-                <a:rPr lang="de-CH" sz="1200" b="1" dirty="0" smtClean="0"/>
+                <a:rPr lang="de-CH" sz="1200" b="1" dirty="0"/>
                 <a:t>Network</a:t>
               </a:r>
-              <a:endParaRPr lang="de-CH" sz="1200" b="1" dirty="0"/>
+            </a:p>
+            <a:p>
+              <a:pPr algn="ctr"/>
+              <a:r>
+                <a:rPr lang="de-CH" sz="1200" dirty="0" smtClean="0"/>
+                <a:t>Network</a:t>
+              </a:r>
             </a:p>
           </p:txBody>
         </p:sp>
@@ -3894,10 +3915,10 @@
         </p:nvGrpSpPr>
         <p:grpSpPr>
           <a:xfrm>
-            <a:off x="683460" y="1844780"/>
-            <a:ext cx="1584220" cy="292198"/>
-            <a:chOff x="1187530" y="1823810"/>
-            <a:chExt cx="1512210" cy="381020"/>
+            <a:off x="683460" y="1757967"/>
+            <a:ext cx="1584220" cy="461665"/>
+            <a:chOff x="1187530" y="1810757"/>
+            <a:chExt cx="1512210" cy="407128"/>
           </a:xfrm>
         </p:grpSpPr>
         <p:sp>
@@ -3948,8 +3969,8 @@
           </p:nvSpPr>
           <p:spPr>
             <a:xfrm>
-              <a:off x="1187530" y="1875820"/>
-              <a:ext cx="1512210" cy="276999"/>
+              <a:off x="1187530" y="1810757"/>
+              <a:ext cx="1512210" cy="407128"/>
             </a:xfrm>
             <a:prstGeom prst="rect">
               <a:avLst/>
@@ -3969,6 +3990,14 @@
               </a:r>
               <a:endParaRPr lang="de-CH" sz="1200" b="1" dirty="0"/>
             </a:p>
+            <a:p>
+              <a:pPr algn="ctr"/>
+              <a:r>
+                <a:rPr lang="de-CH" sz="1200" dirty="0" smtClean="0"/>
+                <a:t>BitcoinGenesisBlock</a:t>
+              </a:r>
+              <a:endParaRPr lang="de-CH" sz="1200" i="1" dirty="0"/>
+            </a:p>
           </p:txBody>
         </p:sp>
       </p:grpSp>
@@ -3980,10 +4009,10 @@
         </p:nvGrpSpPr>
         <p:grpSpPr>
           <a:xfrm>
-            <a:off x="683460" y="2206891"/>
-            <a:ext cx="1584220" cy="288040"/>
-            <a:chOff x="1187530" y="1810756"/>
-            <a:chExt cx="1512210" cy="407128"/>
+            <a:off x="683460" y="2262036"/>
+            <a:ext cx="1584220" cy="461665"/>
+            <a:chOff x="1187530" y="1796809"/>
+            <a:chExt cx="1512210" cy="435024"/>
           </a:xfrm>
         </p:grpSpPr>
         <p:sp>
@@ -4034,8 +4063,8 @@
           </p:nvSpPr>
           <p:spPr>
             <a:xfrm>
-              <a:off x="1187530" y="1810756"/>
-              <a:ext cx="1512210" cy="407128"/>
+              <a:off x="1187530" y="1796809"/>
+              <a:ext cx="1512210" cy="435024"/>
             </a:xfrm>
             <a:prstGeom prst="rect">
               <a:avLst/>
@@ -4055,6 +4084,14 @@
               </a:r>
               <a:endParaRPr lang="de-CH" sz="1200" b="1" dirty="0"/>
             </a:p>
+            <a:p>
+              <a:pPr algn="ctr"/>
+              <a:r>
+                <a:rPr lang="de-CH" sz="1200" dirty="0" smtClean="0"/>
+                <a:t>BitcoinPayloadParser</a:t>
+              </a:r>
+              <a:endParaRPr lang="de-CH" sz="1200" i="1" dirty="0"/>
+            </a:p>
           </p:txBody>
         </p:sp>
       </p:grpSp>
@@ -4066,10 +4103,10 @@
         </p:nvGrpSpPr>
         <p:grpSpPr>
           <a:xfrm>
-            <a:off x="683460" y="2564881"/>
-            <a:ext cx="1584220" cy="288040"/>
-            <a:chOff x="1187530" y="1823810"/>
-            <a:chExt cx="1512210" cy="381020"/>
+            <a:off x="683460" y="2766108"/>
+            <a:ext cx="1584220" cy="461665"/>
+            <a:chOff x="1187530" y="1810758"/>
+            <a:chExt cx="1512210" cy="407128"/>
           </a:xfrm>
         </p:grpSpPr>
         <p:sp>
@@ -4120,8 +4157,8 @@
           </p:nvSpPr>
           <p:spPr>
             <a:xfrm>
-              <a:off x="1187530" y="1875820"/>
-              <a:ext cx="1512210" cy="276999"/>
+              <a:off x="1187530" y="1810758"/>
+              <a:ext cx="1512210" cy="407128"/>
             </a:xfrm>
             <a:prstGeom prst="rect">
               <a:avLst/>
@@ -4141,6 +4178,14 @@
               </a:r>
               <a:endParaRPr lang="de-CH" sz="1200" b="1" dirty="0"/>
             </a:p>
+            <a:p>
+              <a:pPr algn="ctr"/>
+              <a:r>
+                <a:rPr lang="de-CH" sz="1200" dirty="0" smtClean="0"/>
+                <a:t>List&lt;BlockLocation&gt;</a:t>
+              </a:r>
+              <a:endParaRPr lang="de-CH" sz="1200" i="1" dirty="0"/>
+            </a:p>
           </p:txBody>
         </p:sp>
       </p:grpSp>
@@ -4154,8 +4199,8 @@
         </p:nvCxnSpPr>
         <p:spPr>
           <a:xfrm>
-            <a:off x="2267680" y="1990879"/>
-            <a:ext cx="1152159" cy="0"/>
+            <a:off x="2267680" y="1988800"/>
+            <a:ext cx="1152159" cy="2079"/>
           </a:xfrm>
           <a:prstGeom prst="straightConnector1">
             <a:avLst/>
@@ -4192,9 +4237,9 @@
           <p:nvPr/>
         </p:nvCxnSpPr>
         <p:spPr>
-          <a:xfrm flipV="1">
-            <a:off x="2267680" y="2348850"/>
-            <a:ext cx="1152160" cy="2062"/>
+          <a:xfrm>
+            <a:off x="2267680" y="2492869"/>
+            <a:ext cx="1152160" cy="0"/>
           </a:xfrm>
           <a:prstGeom prst="straightConnector1">
             <a:avLst/>
@@ -4231,8 +4276,8 @@
           <p:nvPr/>
         </p:nvCxnSpPr>
         <p:spPr>
-          <a:xfrm flipV="1">
-            <a:off x="2267680" y="2708900"/>
+          <a:xfrm>
+            <a:off x="2267680" y="2996941"/>
             <a:ext cx="1152160" cy="1"/>
           </a:xfrm>
           <a:prstGeom prst="straightConnector1">
@@ -4269,8 +4314,8 @@
         </p:nvSpPr>
         <p:spPr>
           <a:xfrm>
-            <a:off x="3419840" y="1873318"/>
-            <a:ext cx="612085" cy="215444"/>
+            <a:off x="3419840" y="1794266"/>
+            <a:ext cx="612085" cy="338554"/>
           </a:xfrm>
           <a:prstGeom prst="rect">
             <a:avLst/>
@@ -4284,8 +4329,14 @@
           <a:lstStyle/>
           <a:p>
             <a:r>
+              <a:rPr lang="de-CH" sz="800" b="1" i="1" dirty="0" smtClean="0"/>
+              <a:t>genesisBlock</a:t>
+            </a:r>
+          </a:p>
+          <a:p>
+            <a:r>
               <a:rPr lang="de-CH" sz="800" i="1" dirty="0" smtClean="0"/>
-              <a:t>genesisBlock</a:t>
+              <a:t>ChainBlock</a:t>
             </a:r>
             <a:endParaRPr lang="de-CH" sz="800" i="1" dirty="0"/>
           </a:p>
@@ -4299,8 +4350,8 @@
         </p:nvSpPr>
         <p:spPr>
           <a:xfrm>
-            <a:off x="3419839" y="2241127"/>
-            <a:ext cx="720101" cy="215444"/>
+            <a:off x="3419839" y="2348850"/>
+            <a:ext cx="720101" cy="338554"/>
           </a:xfrm>
           <a:prstGeom prst="rect">
             <a:avLst/>
@@ -4314,8 +4365,16 @@
           <a:lstStyle/>
           <a:p>
             <a:r>
-              <a:rPr lang="de-CH" sz="800" i="1" dirty="0" smtClean="0"/>
+              <a:rPr lang="de-CH" sz="800" b="1" i="1" dirty="0" smtClean="0"/>
               <a:t>payloadParser</a:t>
+            </a:r>
+          </a:p>
+          <a:p>
+            <a:r>
+              <a:rPr lang="de-CH" sz="800" i="1" dirty="0">
+                <a:latin typeface="Arial Narrow" panose="020B0606020202030204" pitchFamily="34" charset="0"/>
+              </a:rPr>
+              <a:t>IPayloadParser</a:t>
             </a:r>
             <a:endParaRPr lang="de-CH" sz="800" i="1" dirty="0"/>
           </a:p>
@@ -4329,8 +4388,8 @@
         </p:nvSpPr>
         <p:spPr>
           <a:xfrm>
-            <a:off x="3419840" y="2601177"/>
-            <a:ext cx="612085" cy="215444"/>
+            <a:off x="3419840" y="2852920"/>
+            <a:ext cx="864120" cy="338554"/>
           </a:xfrm>
           <a:prstGeom prst="rect">
             <a:avLst/>
@@ -4344,112 +4403,26 @@
           <a:lstStyle/>
           <a:p>
             <a:r>
-              <a:rPr lang="de-CH" sz="800" i="1" dirty="0" smtClean="0"/>
+              <a:rPr lang="de-CH" sz="800" b="1" i="1" dirty="0" smtClean="0"/>
               <a:t>checkpoints</a:t>
             </a:r>
-            <a:endParaRPr lang="de-CH" sz="800" i="1" dirty="0"/>
-          </a:p>
-        </p:txBody>
-      </p:sp>
-      <p:sp>
-        <p:nvSpPr>
-          <p:cNvPr id="40" name="TextBox 39"/>
-          <p:cNvSpPr txBox="1"/>
-          <p:nvPr/>
-        </p:nvSpPr>
-        <p:spPr>
-          <a:xfrm>
-            <a:off x="2339690" y="1772770"/>
-            <a:ext cx="936130" cy="215444"/>
-          </a:xfrm>
-          <a:prstGeom prst="rect">
-            <a:avLst/>
-          </a:prstGeom>
-          <a:noFill/>
-        </p:spPr>
-        <p:txBody>
-          <a:bodyPr wrap="square" lIns="36000" rIns="36000" rtlCol="0">
-            <a:spAutoFit/>
-          </a:bodyPr>
-          <a:lstStyle/>
-          <a:p>
-            <a:pPr algn="ctr"/>
-            <a:r>
-              <a:rPr lang="de-CH" sz="800" b="1" dirty="0" smtClean="0">
+          </a:p>
+          <a:p>
+            <a:r>
+              <a:rPr lang="de-CH" sz="800" i="1" dirty="0">
                 <a:latin typeface="Arial Narrow" panose="020B0606020202030204" pitchFamily="34" charset="0"/>
               </a:rPr>
-              <a:t>ChainBlock</a:t>
-            </a:r>
-            <a:endParaRPr lang="de-CH" sz="800" b="1" dirty="0">
+              <a:t>List&lt;BlockLocation</a:t>
+            </a:r>
+            <a:r>
+              <a:rPr lang="de-CH" sz="800" i="1" dirty="0" smtClean="0">
+                <a:latin typeface="Arial Narrow" panose="020B0606020202030204" pitchFamily="34" charset="0"/>
+              </a:rPr>
+              <a:t>&gt;</a:t>
+            </a:r>
+            <a:endParaRPr lang="de-CH" sz="800" i="1" dirty="0">
               <a:latin typeface="Arial Narrow" panose="020B0606020202030204" pitchFamily="34" charset="0"/>
             </a:endParaRPr>
-          </a:p>
-        </p:txBody>
-      </p:sp>
-      <p:sp>
-        <p:nvSpPr>
-          <p:cNvPr id="41" name="TextBox 40"/>
-          <p:cNvSpPr txBox="1"/>
-          <p:nvPr/>
-        </p:nvSpPr>
-        <p:spPr>
-          <a:xfrm>
-            <a:off x="2339690" y="2132820"/>
-            <a:ext cx="1008140" cy="215444"/>
-          </a:xfrm>
-          <a:prstGeom prst="rect">
-            <a:avLst/>
-          </a:prstGeom>
-          <a:noFill/>
-        </p:spPr>
-        <p:txBody>
-          <a:bodyPr wrap="square" lIns="36000" rIns="36000" rtlCol="0">
-            <a:spAutoFit/>
-          </a:bodyPr>
-          <a:lstStyle/>
-          <a:p>
-            <a:pPr algn="ctr"/>
-            <a:r>
-              <a:rPr lang="de-CH" sz="800" b="1" dirty="0" smtClean="0">
-                <a:latin typeface="Arial Narrow" panose="020B0606020202030204" pitchFamily="34" charset="0"/>
-              </a:rPr>
-              <a:t>IPayloadParser</a:t>
-            </a:r>
-            <a:endParaRPr lang="de-CH" sz="800" b="1" dirty="0">
-              <a:latin typeface="Arial Narrow" panose="020B0606020202030204" pitchFamily="34" charset="0"/>
-            </a:endParaRPr>
-          </a:p>
-        </p:txBody>
-      </p:sp>
-      <p:sp>
-        <p:nvSpPr>
-          <p:cNvPr id="42" name="TextBox 41"/>
-          <p:cNvSpPr txBox="1"/>
-          <p:nvPr/>
-        </p:nvSpPr>
-        <p:spPr>
-          <a:xfrm>
-            <a:off x="2303685" y="2492870"/>
-            <a:ext cx="1008140" cy="215444"/>
-          </a:xfrm>
-          <a:prstGeom prst="rect">
-            <a:avLst/>
-          </a:prstGeom>
-          <a:noFill/>
-        </p:spPr>
-        <p:txBody>
-          <a:bodyPr wrap="square" lIns="36000" rIns="36000" rtlCol="0">
-            <a:spAutoFit/>
-          </a:bodyPr>
-          <a:lstStyle/>
-          <a:p>
-            <a:pPr algn="ctr"/>
-            <a:r>
-              <a:rPr lang="de-CH" sz="800" b="1" dirty="0">
-                <a:latin typeface="Arial Narrow" panose="020B0606020202030204" pitchFamily="34" charset="0"/>
-              </a:rPr>
-              <a:t>List&lt;BlockLocation&gt;</a:t>
-            </a:r>
           </a:p>
         </p:txBody>
       </p:sp>
@@ -4500,8 +4473,8 @@
         </p:nvSpPr>
         <p:spPr>
           <a:xfrm>
-            <a:off x="3843852" y="3933656"/>
-            <a:ext cx="612085" cy="215444"/>
+            <a:off x="3843852" y="3861060"/>
+            <a:ext cx="612085" cy="338554"/>
           </a:xfrm>
           <a:prstGeom prst="rect">
             <a:avLst/>
@@ -4516,45 +4489,17 @@
           <a:p>
             <a:pPr algn="ctr"/>
             <a:r>
+              <a:rPr lang="de-CH" sz="800" b="1" i="1" dirty="0" smtClean="0"/>
+              <a:t>network</a:t>
+            </a:r>
+          </a:p>
+          <a:p>
+            <a:pPr algn="ctr"/>
+            <a:r>
               <a:rPr lang="de-CH" sz="800" i="1" dirty="0" smtClean="0"/>
-              <a:t>network</a:t>
+              <a:t>Network</a:t>
             </a:r>
             <a:endParaRPr lang="de-CH" sz="800" i="1" dirty="0"/>
-          </a:p>
-        </p:txBody>
-      </p:sp>
-      <p:sp>
-        <p:nvSpPr>
-          <p:cNvPr id="47" name="TextBox 46"/>
-          <p:cNvSpPr txBox="1"/>
-          <p:nvPr/>
-        </p:nvSpPr>
-        <p:spPr>
-          <a:xfrm>
-            <a:off x="3675268" y="4430453"/>
-            <a:ext cx="490111" cy="215444"/>
-          </a:xfrm>
-          <a:prstGeom prst="rect">
-            <a:avLst/>
-          </a:prstGeom>
-          <a:noFill/>
-        </p:spPr>
-        <p:txBody>
-          <a:bodyPr wrap="square" lIns="36000" rIns="36000" rtlCol="0">
-            <a:spAutoFit/>
-          </a:bodyPr>
-          <a:lstStyle/>
-          <a:p>
-            <a:pPr algn="ctr"/>
-            <a:r>
-              <a:rPr lang="de-CH" sz="800" b="1" dirty="0" smtClean="0">
-                <a:latin typeface="Arial Narrow" panose="020B0606020202030204" pitchFamily="34" charset="0"/>
-              </a:rPr>
-              <a:t>Network</a:t>
-            </a:r>
-            <a:endParaRPr lang="de-CH" sz="800" b="1" dirty="0">
-              <a:latin typeface="Arial Narrow" panose="020B0606020202030204" pitchFamily="34" charset="0"/>
-            </a:endParaRPr>
           </a:p>
         </p:txBody>
       </p:sp>
@@ -4603,8 +4548,8 @@
         </p:nvSpPr>
         <p:spPr>
           <a:xfrm>
-            <a:off x="6454079" y="3933655"/>
-            <a:ext cx="556441" cy="215444"/>
+            <a:off x="6454079" y="3861060"/>
+            <a:ext cx="556441" cy="338554"/>
           </a:xfrm>
           <a:prstGeom prst="rect">
             <a:avLst/>
@@ -4619,45 +4564,17 @@
           <a:p>
             <a:pPr algn="ctr"/>
             <a:r>
+              <a:rPr lang="de-CH" sz="800" b="1" i="1" dirty="0" smtClean="0"/>
+              <a:t>network</a:t>
+            </a:r>
+          </a:p>
+          <a:p>
+            <a:pPr algn="ctr"/>
+            <a:r>
               <a:rPr lang="de-CH" sz="800" i="1" dirty="0" smtClean="0"/>
-              <a:t>network</a:t>
+              <a:t>Network</a:t>
             </a:r>
             <a:endParaRPr lang="de-CH" sz="800" i="1" dirty="0"/>
-          </a:p>
-        </p:txBody>
-      </p:sp>
-      <p:sp>
-        <p:nvSpPr>
-          <p:cNvPr id="50" name="TextBox 49"/>
-          <p:cNvSpPr txBox="1"/>
-          <p:nvPr/>
-        </p:nvSpPr>
-        <p:spPr>
-          <a:xfrm>
-            <a:off x="6300240" y="4430452"/>
-            <a:ext cx="445555" cy="215444"/>
-          </a:xfrm>
-          <a:prstGeom prst="rect">
-            <a:avLst/>
-          </a:prstGeom>
-          <a:noFill/>
-        </p:spPr>
-        <p:txBody>
-          <a:bodyPr wrap="square" lIns="36000" rIns="36000" rtlCol="0">
-            <a:spAutoFit/>
-          </a:bodyPr>
-          <a:lstStyle/>
-          <a:p>
-            <a:pPr algn="ctr"/>
-            <a:r>
-              <a:rPr lang="de-CH" sz="800" b="1" dirty="0" smtClean="0">
-                <a:latin typeface="Arial Narrow" panose="020B0606020202030204" pitchFamily="34" charset="0"/>
-              </a:rPr>
-              <a:t>Network</a:t>
-            </a:r>
-            <a:endParaRPr lang="de-CH" sz="800" b="1" dirty="0">
-              <a:latin typeface="Arial Narrow" panose="020B0606020202030204" pitchFamily="34" charset="0"/>
-            </a:endParaRPr>
           </a:p>
         </p:txBody>
       </p:sp>
@@ -4706,8 +4623,8 @@
         </p:nvSpPr>
         <p:spPr>
           <a:xfrm>
-            <a:off x="6012199" y="1881077"/>
-            <a:ext cx="720101" cy="215444"/>
+            <a:off x="6012199" y="1844780"/>
+            <a:ext cx="720101" cy="338554"/>
           </a:xfrm>
           <a:prstGeom prst="rect">
             <a:avLst/>
@@ -4721,45 +4638,23 @@
           <a:lstStyle/>
           <a:p>
             <a:r>
+              <a:rPr lang="de-CH" sz="800" b="1" i="1" dirty="0"/>
+              <a:t>b</a:t>
+            </a:r>
+            <a:r>
+              <a:rPr lang="de-CH" sz="800" b="1" i="1" dirty="0" smtClean="0"/>
+              <a:t>lockchain</a:t>
+            </a:r>
+          </a:p>
+          <a:p>
+            <a:r>
+              <a:rPr lang="de-CH" sz="800" i="1" dirty="0"/>
+              <a:t>B</a:t>
+            </a:r>
+            <a:r>
               <a:rPr lang="de-CH" sz="800" i="1" dirty="0" smtClean="0"/>
-              <a:t>blockchain</a:t>
-            </a:r>
-            <a:endParaRPr lang="de-CH" sz="800" i="1" dirty="0"/>
-          </a:p>
-        </p:txBody>
-      </p:sp>
-      <p:sp>
-        <p:nvSpPr>
-          <p:cNvPr id="53" name="TextBox 52"/>
-          <p:cNvSpPr txBox="1"/>
-          <p:nvPr/>
-        </p:nvSpPr>
-        <p:spPr>
-          <a:xfrm>
-            <a:off x="4932050" y="1772770"/>
-            <a:ext cx="1008140" cy="215444"/>
-          </a:xfrm>
-          <a:prstGeom prst="rect">
-            <a:avLst/>
-          </a:prstGeom>
-          <a:noFill/>
-        </p:spPr>
-        <p:txBody>
-          <a:bodyPr wrap="square" lIns="36000" rIns="36000" rtlCol="0">
-            <a:spAutoFit/>
-          </a:bodyPr>
-          <a:lstStyle/>
-          <a:p>
-            <a:pPr algn="ctr"/>
-            <a:r>
-              <a:rPr lang="de-CH" sz="800" b="1" dirty="0" smtClean="0">
-                <a:latin typeface="Arial Narrow" panose="020B0606020202030204" pitchFamily="34" charset="0"/>
-              </a:rPr>
-              <a:t>Blockchain</a:t>
-            </a:r>
-            <a:endParaRPr lang="de-CH" sz="800" b="1" dirty="0">
-              <a:latin typeface="Arial Narrow" panose="020B0606020202030204" pitchFamily="34" charset="0"/>
-            </a:endParaRPr>
+              <a:t>lockchain</a:t>
+            </a:r>
           </a:p>
         </p:txBody>
       </p:sp>
@@ -5475,7 +5370,7 @@
               <a:p>
                 <a:pPr algn="ctr"/>
                 <a:r>
-                  <a:rPr lang="de-CH" sz="1200" b="1" smtClean="0"/>
+                  <a:rPr lang="de-CH" sz="1200" b="1" dirty="0" smtClean="0"/>
                   <a:t>MainChain</a:t>
                 </a:r>
                 <a:endParaRPr lang="de-CH" sz="1200" b="1" dirty="0"/>

</xml_diff>